<commit_message>
Load plotly. Update ppt with mockup
</commit_message>
<xml_diff>
--- a/stonks_app.pptx
+++ b/stonks_app.pptx
@@ -9,8 +9,9 @@
     <p:sldId id="257" r:id="rId3"/>
     <p:sldId id="259" r:id="rId4"/>
     <p:sldId id="258" r:id="rId5"/>
-    <p:sldId id="261" r:id="rId6"/>
-    <p:sldId id="260" r:id="rId7"/>
+    <p:sldId id="262" r:id="rId6"/>
+    <p:sldId id="261" r:id="rId7"/>
+    <p:sldId id="260" r:id="rId8"/>
   </p:sldIdLst>
   <p:sldSz cx="12192000" cy="6858000"/>
   <p:notesSz cx="6858000" cy="9144000"/>
@@ -109,6 +110,11 @@
       </a:defRPr>
     </a:lvl9pPr>
   </p:defaultTextStyle>
+  <p:extLst>
+    <p:ext uri="{EFAFB233-063F-42B5-8137-9DF3F51BA10A}">
+      <p15:sldGuideLst xmlns:p15="http://schemas.microsoft.com/office/powerpoint/2012/main"/>
+    </p:ext>
+  </p:extLst>
 </p:presentation>
 </file>
 
@@ -261,7 +267,7 @@
           <a:p>
             <a:fld id="{754E430C-3569-FD4C-95A9-807513886840}" type="datetimeFigureOut">
               <a:rPr lang="en-US" smtClean="0"/>
-              <a:t>7/17/21</a:t>
+              <a:t>10/2/21</a:t>
             </a:fld>
             <a:endParaRPr lang="en-US"/>
           </a:p>
@@ -461,7 +467,7 @@
           <a:p>
             <a:fld id="{754E430C-3569-FD4C-95A9-807513886840}" type="datetimeFigureOut">
               <a:rPr lang="en-US" smtClean="0"/>
-              <a:t>7/17/21</a:t>
+              <a:t>10/2/21</a:t>
             </a:fld>
             <a:endParaRPr lang="en-US"/>
           </a:p>
@@ -671,7 +677,7 @@
           <a:p>
             <a:fld id="{754E430C-3569-FD4C-95A9-807513886840}" type="datetimeFigureOut">
               <a:rPr lang="en-US" smtClean="0"/>
-              <a:t>7/17/21</a:t>
+              <a:t>10/2/21</a:t>
             </a:fld>
             <a:endParaRPr lang="en-US"/>
           </a:p>
@@ -871,7 +877,7 @@
           <a:p>
             <a:fld id="{754E430C-3569-FD4C-95A9-807513886840}" type="datetimeFigureOut">
               <a:rPr lang="en-US" smtClean="0"/>
-              <a:t>7/17/21</a:t>
+              <a:t>10/2/21</a:t>
             </a:fld>
             <a:endParaRPr lang="en-US"/>
           </a:p>
@@ -1147,7 +1153,7 @@
           <a:p>
             <a:fld id="{754E430C-3569-FD4C-95A9-807513886840}" type="datetimeFigureOut">
               <a:rPr lang="en-US" smtClean="0"/>
-              <a:t>7/17/21</a:t>
+              <a:t>10/2/21</a:t>
             </a:fld>
             <a:endParaRPr lang="en-US"/>
           </a:p>
@@ -1415,7 +1421,7 @@
           <a:p>
             <a:fld id="{754E430C-3569-FD4C-95A9-807513886840}" type="datetimeFigureOut">
               <a:rPr lang="en-US" smtClean="0"/>
-              <a:t>7/17/21</a:t>
+              <a:t>10/2/21</a:t>
             </a:fld>
             <a:endParaRPr lang="en-US"/>
           </a:p>
@@ -1830,7 +1836,7 @@
           <a:p>
             <a:fld id="{754E430C-3569-FD4C-95A9-807513886840}" type="datetimeFigureOut">
               <a:rPr lang="en-US" smtClean="0"/>
-              <a:t>7/17/21</a:t>
+              <a:t>10/2/21</a:t>
             </a:fld>
             <a:endParaRPr lang="en-US"/>
           </a:p>
@@ -1972,7 +1978,7 @@
           <a:p>
             <a:fld id="{754E430C-3569-FD4C-95A9-807513886840}" type="datetimeFigureOut">
               <a:rPr lang="en-US" smtClean="0"/>
-              <a:t>7/17/21</a:t>
+              <a:t>10/2/21</a:t>
             </a:fld>
             <a:endParaRPr lang="en-US"/>
           </a:p>
@@ -2085,7 +2091,7 @@
           <a:p>
             <a:fld id="{754E430C-3569-FD4C-95A9-807513886840}" type="datetimeFigureOut">
               <a:rPr lang="en-US" smtClean="0"/>
-              <a:t>7/17/21</a:t>
+              <a:t>10/2/21</a:t>
             </a:fld>
             <a:endParaRPr lang="en-US"/>
           </a:p>
@@ -2398,7 +2404,7 @@
           <a:p>
             <a:fld id="{754E430C-3569-FD4C-95A9-807513886840}" type="datetimeFigureOut">
               <a:rPr lang="en-US" smtClean="0"/>
-              <a:t>7/17/21</a:t>
+              <a:t>10/2/21</a:t>
             </a:fld>
             <a:endParaRPr lang="en-US"/>
           </a:p>
@@ -2687,7 +2693,7 @@
           <a:p>
             <a:fld id="{754E430C-3569-FD4C-95A9-807513886840}" type="datetimeFigureOut">
               <a:rPr lang="en-US" smtClean="0"/>
-              <a:t>7/17/21</a:t>
+              <a:t>10/2/21</a:t>
             </a:fld>
             <a:endParaRPr lang="en-US"/>
           </a:p>
@@ -2930,7 +2936,7 @@
           <a:p>
             <a:fld id="{754E430C-3569-FD4C-95A9-807513886840}" type="datetimeFigureOut">
               <a:rPr lang="en-US" smtClean="0"/>
-              <a:t>7/17/21</a:t>
+              <a:t>10/2/21</a:t>
             </a:fld>
             <a:endParaRPr lang="en-US"/>
           </a:p>
@@ -10732,6 +10738,2014 @@
       </p:grpSpPr>
       <p:sp>
         <p:nvSpPr>
+          <p:cNvPr id="5" name="Rectangle 4">
+            <a:extLst>
+              <a:ext uri="{FF2B5EF4-FFF2-40B4-BE49-F238E27FC236}">
+                <a16:creationId xmlns:a16="http://schemas.microsoft.com/office/drawing/2014/main" id="{B46CD1EE-59E1-3D4D-B9FF-094FBA25B477}"/>
+              </a:ext>
+            </a:extLst>
+          </p:cNvPr>
+          <p:cNvSpPr/>
+          <p:nvPr/>
+        </p:nvSpPr>
+        <p:spPr>
+          <a:xfrm>
+            <a:off x="1781956" y="665901"/>
+            <a:ext cx="9823622" cy="642307"/>
+          </a:xfrm>
+          <a:prstGeom prst="rect">
+            <a:avLst/>
+          </a:prstGeom>
+          <a:noFill/>
+          <a:ln>
+            <a:solidFill>
+              <a:schemeClr val="accent1"/>
+            </a:solidFill>
+          </a:ln>
+        </p:spPr>
+        <p:style>
+          <a:lnRef idx="2">
+            <a:schemeClr val="accent1">
+              <a:shade val="50000"/>
+            </a:schemeClr>
+          </a:lnRef>
+          <a:fillRef idx="1">
+            <a:schemeClr val="accent1"/>
+          </a:fillRef>
+          <a:effectRef idx="0">
+            <a:schemeClr val="accent1"/>
+          </a:effectRef>
+          <a:fontRef idx="minor">
+            <a:schemeClr val="lt1"/>
+          </a:fontRef>
+        </p:style>
+        <p:txBody>
+          <a:bodyPr rtlCol="0" anchor="ctr"/>
+          <a:lstStyle/>
+          <a:p>
+            <a:pPr algn="ctr"/>
+            <a:r>
+              <a:rPr lang="en-US" dirty="0">
+                <a:solidFill>
+                  <a:schemeClr val="tx1"/>
+                </a:solidFill>
+              </a:rPr>
+              <a:t>Intro / Description</a:t>
+            </a:r>
+          </a:p>
+        </p:txBody>
+      </p:sp>
+      <p:sp>
+        <p:nvSpPr>
+          <p:cNvPr id="6" name="Rectangle 5">
+            <a:extLst>
+              <a:ext uri="{FF2B5EF4-FFF2-40B4-BE49-F238E27FC236}">
+                <a16:creationId xmlns:a16="http://schemas.microsoft.com/office/drawing/2014/main" id="{DF53B666-E4B0-7549-AEB1-46537A28E353}"/>
+              </a:ext>
+            </a:extLst>
+          </p:cNvPr>
+          <p:cNvSpPr/>
+          <p:nvPr/>
+        </p:nvSpPr>
+        <p:spPr>
+          <a:xfrm>
+            <a:off x="154280" y="628471"/>
+            <a:ext cx="1541355" cy="2567490"/>
+          </a:xfrm>
+          <a:prstGeom prst="rect">
+            <a:avLst/>
+          </a:prstGeom>
+          <a:noFill/>
+          <a:ln>
+            <a:solidFill>
+              <a:schemeClr val="accent1"/>
+            </a:solidFill>
+          </a:ln>
+        </p:spPr>
+        <p:style>
+          <a:lnRef idx="2">
+            <a:schemeClr val="accent1">
+              <a:shade val="50000"/>
+            </a:schemeClr>
+          </a:lnRef>
+          <a:fillRef idx="1">
+            <a:schemeClr val="accent1"/>
+          </a:fillRef>
+          <a:effectRef idx="0">
+            <a:schemeClr val="accent1"/>
+          </a:effectRef>
+          <a:fontRef idx="minor">
+            <a:schemeClr val="lt1"/>
+          </a:fontRef>
+        </p:style>
+        <p:txBody>
+          <a:bodyPr rtlCol="0" anchor="t"/>
+          <a:lstStyle/>
+          <a:p>
+            <a:r>
+              <a:rPr lang="en-US" dirty="0">
+                <a:solidFill>
+                  <a:schemeClr val="tx1"/>
+                </a:solidFill>
+              </a:rPr>
+              <a:t>Enter tickers:</a:t>
+            </a:r>
+          </a:p>
+        </p:txBody>
+      </p:sp>
+      <p:sp>
+        <p:nvSpPr>
+          <p:cNvPr id="7" name="Rectangle 6">
+            <a:extLst>
+              <a:ext uri="{FF2B5EF4-FFF2-40B4-BE49-F238E27FC236}">
+                <a16:creationId xmlns:a16="http://schemas.microsoft.com/office/drawing/2014/main" id="{61CDE785-376C-B34F-A746-9A0B8DEA9578}"/>
+              </a:ext>
+            </a:extLst>
+          </p:cNvPr>
+          <p:cNvSpPr/>
+          <p:nvPr/>
+        </p:nvSpPr>
+        <p:spPr>
+          <a:xfrm>
+            <a:off x="3402227" y="6718252"/>
+            <a:ext cx="2693773" cy="119273"/>
+          </a:xfrm>
+          <a:prstGeom prst="rect">
+            <a:avLst/>
+          </a:prstGeom>
+          <a:noFill/>
+          <a:ln>
+            <a:solidFill>
+              <a:schemeClr val="accent1"/>
+            </a:solidFill>
+          </a:ln>
+        </p:spPr>
+        <p:style>
+          <a:lnRef idx="2">
+            <a:schemeClr val="accent1">
+              <a:shade val="50000"/>
+            </a:schemeClr>
+          </a:lnRef>
+          <a:fillRef idx="1">
+            <a:schemeClr val="accent1"/>
+          </a:fillRef>
+          <a:effectRef idx="0">
+            <a:schemeClr val="accent1"/>
+          </a:effectRef>
+          <a:fontRef idx="minor">
+            <a:schemeClr val="lt1"/>
+          </a:fontRef>
+        </p:style>
+        <p:txBody>
+          <a:bodyPr rtlCol="0" anchor="ctr"/>
+          <a:lstStyle/>
+          <a:p>
+            <a:pPr algn="ctr"/>
+            <a:r>
+              <a:rPr lang="en-US" sz="1050" dirty="0">
+                <a:solidFill>
+                  <a:schemeClr val="tx1"/>
+                </a:solidFill>
+              </a:rPr>
+              <a:t>Download csv</a:t>
+            </a:r>
+          </a:p>
+        </p:txBody>
+      </p:sp>
+      <p:sp>
+        <p:nvSpPr>
+          <p:cNvPr id="11" name="Rectangle 10">
+            <a:extLst>
+              <a:ext uri="{FF2B5EF4-FFF2-40B4-BE49-F238E27FC236}">
+                <a16:creationId xmlns:a16="http://schemas.microsoft.com/office/drawing/2014/main" id="{EBB8DD1E-C838-FB47-8496-8F38F0C2840C}"/>
+              </a:ext>
+            </a:extLst>
+          </p:cNvPr>
+          <p:cNvSpPr/>
+          <p:nvPr/>
+        </p:nvSpPr>
+        <p:spPr>
+          <a:xfrm>
+            <a:off x="6810453" y="4378078"/>
+            <a:ext cx="4795125" cy="1368556"/>
+          </a:xfrm>
+          <a:prstGeom prst="rect">
+            <a:avLst/>
+          </a:prstGeom>
+          <a:noFill/>
+          <a:ln>
+            <a:solidFill>
+              <a:schemeClr val="accent1"/>
+            </a:solidFill>
+          </a:ln>
+        </p:spPr>
+        <p:style>
+          <a:lnRef idx="2">
+            <a:schemeClr val="accent1">
+              <a:shade val="50000"/>
+            </a:schemeClr>
+          </a:lnRef>
+          <a:fillRef idx="1">
+            <a:schemeClr val="accent1"/>
+          </a:fillRef>
+          <a:effectRef idx="0">
+            <a:schemeClr val="accent1"/>
+          </a:effectRef>
+          <a:fontRef idx="minor">
+            <a:schemeClr val="lt1"/>
+          </a:fontRef>
+        </p:style>
+        <p:txBody>
+          <a:bodyPr rtlCol="0" anchor="ctr"/>
+          <a:lstStyle/>
+          <a:p>
+            <a:r>
+              <a:rPr lang="en-US" dirty="0">
+                <a:solidFill>
+                  <a:schemeClr val="tx1"/>
+                </a:solidFill>
+              </a:rPr>
+              <a:t>Correlation matrix</a:t>
+            </a:r>
+          </a:p>
+        </p:txBody>
+      </p:sp>
+      <p:sp>
+        <p:nvSpPr>
+          <p:cNvPr id="12" name="Rectangle 11">
+            <a:extLst>
+              <a:ext uri="{FF2B5EF4-FFF2-40B4-BE49-F238E27FC236}">
+                <a16:creationId xmlns:a16="http://schemas.microsoft.com/office/drawing/2014/main" id="{295C2E40-945E-9147-97DC-BCFBA3EDF430}"/>
+              </a:ext>
+            </a:extLst>
+          </p:cNvPr>
+          <p:cNvSpPr/>
+          <p:nvPr/>
+        </p:nvSpPr>
+        <p:spPr>
+          <a:xfrm>
+            <a:off x="154280" y="2879779"/>
+            <a:ext cx="1239514" cy="308919"/>
+          </a:xfrm>
+          <a:prstGeom prst="rect">
+            <a:avLst/>
+          </a:prstGeom>
+          <a:noFill/>
+          <a:ln>
+            <a:solidFill>
+              <a:schemeClr val="accent1"/>
+            </a:solidFill>
+          </a:ln>
+        </p:spPr>
+        <p:style>
+          <a:lnRef idx="2">
+            <a:schemeClr val="accent1">
+              <a:shade val="50000"/>
+            </a:schemeClr>
+          </a:lnRef>
+          <a:fillRef idx="1">
+            <a:schemeClr val="accent1"/>
+          </a:fillRef>
+          <a:effectRef idx="0">
+            <a:schemeClr val="accent1"/>
+          </a:effectRef>
+          <a:fontRef idx="minor">
+            <a:schemeClr val="lt1"/>
+          </a:fontRef>
+        </p:style>
+        <p:txBody>
+          <a:bodyPr rtlCol="0" anchor="ctr"/>
+          <a:lstStyle/>
+          <a:p>
+            <a:r>
+              <a:rPr lang="en-US" dirty="0">
+                <a:solidFill>
+                  <a:schemeClr val="tx1"/>
+                </a:solidFill>
+              </a:rPr>
+              <a:t>GO</a:t>
+            </a:r>
+          </a:p>
+        </p:txBody>
+      </p:sp>
+      <p:sp>
+        <p:nvSpPr>
+          <p:cNvPr id="14" name="Rectangle 13">
+            <a:extLst>
+              <a:ext uri="{FF2B5EF4-FFF2-40B4-BE49-F238E27FC236}">
+                <a16:creationId xmlns:a16="http://schemas.microsoft.com/office/drawing/2014/main" id="{FB12DFD2-10C5-9A4B-8D21-35258CCA06DF}"/>
+              </a:ext>
+            </a:extLst>
+          </p:cNvPr>
+          <p:cNvSpPr/>
+          <p:nvPr/>
+        </p:nvSpPr>
+        <p:spPr>
+          <a:xfrm>
+            <a:off x="6810453" y="2182599"/>
+            <a:ext cx="4795125" cy="1926170"/>
+          </a:xfrm>
+          <a:prstGeom prst="rect">
+            <a:avLst/>
+          </a:prstGeom>
+          <a:noFill/>
+          <a:ln>
+            <a:solidFill>
+              <a:schemeClr val="accent1"/>
+            </a:solidFill>
+          </a:ln>
+        </p:spPr>
+        <p:style>
+          <a:lnRef idx="2">
+            <a:schemeClr val="accent1">
+              <a:shade val="50000"/>
+            </a:schemeClr>
+          </a:lnRef>
+          <a:fillRef idx="1">
+            <a:schemeClr val="accent1"/>
+          </a:fillRef>
+          <a:effectRef idx="0">
+            <a:schemeClr val="accent1"/>
+          </a:effectRef>
+          <a:fontRef idx="minor">
+            <a:schemeClr val="lt1"/>
+          </a:fontRef>
+        </p:style>
+        <p:txBody>
+          <a:bodyPr rtlCol="0" anchor="ctr"/>
+          <a:lstStyle/>
+          <a:p>
+            <a:r>
+              <a:rPr lang="en-US" dirty="0">
+                <a:solidFill>
+                  <a:schemeClr val="tx1"/>
+                </a:solidFill>
+              </a:rPr>
+              <a:t>Show efficient frontier</a:t>
+            </a:r>
+          </a:p>
+        </p:txBody>
+      </p:sp>
+      <p:sp>
+        <p:nvSpPr>
+          <p:cNvPr id="20" name="Rectangle 19">
+            <a:extLst>
+              <a:ext uri="{FF2B5EF4-FFF2-40B4-BE49-F238E27FC236}">
+                <a16:creationId xmlns:a16="http://schemas.microsoft.com/office/drawing/2014/main" id="{E1B8B090-8882-5D4B-A4DC-BC36F8E4384F}"/>
+              </a:ext>
+            </a:extLst>
+          </p:cNvPr>
+          <p:cNvSpPr/>
+          <p:nvPr/>
+        </p:nvSpPr>
+        <p:spPr>
+          <a:xfrm>
+            <a:off x="7296846" y="6731217"/>
+            <a:ext cx="3270421" cy="119273"/>
+          </a:xfrm>
+          <a:prstGeom prst="rect">
+            <a:avLst/>
+          </a:prstGeom>
+          <a:noFill/>
+          <a:ln>
+            <a:solidFill>
+              <a:schemeClr val="accent1"/>
+            </a:solidFill>
+          </a:ln>
+        </p:spPr>
+        <p:style>
+          <a:lnRef idx="2">
+            <a:schemeClr val="accent1">
+              <a:shade val="50000"/>
+            </a:schemeClr>
+          </a:lnRef>
+          <a:fillRef idx="1">
+            <a:schemeClr val="accent1"/>
+          </a:fillRef>
+          <a:effectRef idx="0">
+            <a:schemeClr val="accent1"/>
+          </a:effectRef>
+          <a:fontRef idx="minor">
+            <a:schemeClr val="lt1"/>
+          </a:fontRef>
+        </p:style>
+        <p:txBody>
+          <a:bodyPr rtlCol="0" anchor="ctr"/>
+          <a:lstStyle/>
+          <a:p>
+            <a:pPr algn="ctr"/>
+            <a:r>
+              <a:rPr lang="en-US" sz="1050" dirty="0" err="1">
+                <a:solidFill>
+                  <a:schemeClr val="tx1"/>
+                </a:solidFill>
+              </a:rPr>
+              <a:t>Github</a:t>
+            </a:r>
+            <a:r>
+              <a:rPr lang="en-US" sz="1050" dirty="0">
+                <a:solidFill>
+                  <a:schemeClr val="tx1"/>
+                </a:solidFill>
+              </a:rPr>
+              <a:t> / </a:t>
+            </a:r>
+            <a:r>
+              <a:rPr lang="en-US" sz="1050" dirty="0" err="1">
+                <a:solidFill>
+                  <a:schemeClr val="tx1"/>
+                </a:solidFill>
+              </a:rPr>
+              <a:t>linkedin</a:t>
+            </a:r>
+            <a:r>
+              <a:rPr lang="en-US" sz="1050" dirty="0">
+                <a:solidFill>
+                  <a:schemeClr val="tx1"/>
+                </a:solidFill>
+              </a:rPr>
+              <a:t> links</a:t>
+            </a:r>
+          </a:p>
+        </p:txBody>
+      </p:sp>
+      <p:sp>
+        <p:nvSpPr>
+          <p:cNvPr id="21" name="Rectangle 20">
+            <a:extLst>
+              <a:ext uri="{FF2B5EF4-FFF2-40B4-BE49-F238E27FC236}">
+                <a16:creationId xmlns:a16="http://schemas.microsoft.com/office/drawing/2014/main" id="{22F46425-2D01-0E4F-B984-3BB91D977D1C}"/>
+              </a:ext>
+            </a:extLst>
+          </p:cNvPr>
+          <p:cNvSpPr/>
+          <p:nvPr/>
+        </p:nvSpPr>
+        <p:spPr>
+          <a:xfrm>
+            <a:off x="-1" y="0"/>
+            <a:ext cx="12082509" cy="398829"/>
+          </a:xfrm>
+          <a:prstGeom prst="rect">
+            <a:avLst/>
+          </a:prstGeom>
+        </p:spPr>
+        <p:style>
+          <a:lnRef idx="2">
+            <a:schemeClr val="accent1">
+              <a:shade val="50000"/>
+            </a:schemeClr>
+          </a:lnRef>
+          <a:fillRef idx="1">
+            <a:schemeClr val="accent1"/>
+          </a:fillRef>
+          <a:effectRef idx="0">
+            <a:schemeClr val="accent1"/>
+          </a:effectRef>
+          <a:fontRef idx="minor">
+            <a:schemeClr val="lt1"/>
+          </a:fontRef>
+        </p:style>
+        <p:txBody>
+          <a:bodyPr rtlCol="0" anchor="ctr"/>
+          <a:lstStyle/>
+          <a:p>
+            <a:pPr algn="ctr"/>
+            <a:endParaRPr lang="en-US" dirty="0"/>
+          </a:p>
+        </p:txBody>
+      </p:sp>
+      <p:sp>
+        <p:nvSpPr>
+          <p:cNvPr id="3" name="TextBox 2">
+            <a:extLst>
+              <a:ext uri="{FF2B5EF4-FFF2-40B4-BE49-F238E27FC236}">
+                <a16:creationId xmlns:a16="http://schemas.microsoft.com/office/drawing/2014/main" id="{A2B1F157-5639-8843-9999-88D57F7359DA}"/>
+              </a:ext>
+            </a:extLst>
+          </p:cNvPr>
+          <p:cNvSpPr txBox="1"/>
+          <p:nvPr/>
+        </p:nvSpPr>
+        <p:spPr>
+          <a:xfrm>
+            <a:off x="334896" y="29497"/>
+            <a:ext cx="800668" cy="369332"/>
+          </a:xfrm>
+          <a:prstGeom prst="rect">
+            <a:avLst/>
+          </a:prstGeom>
+          <a:noFill/>
+        </p:spPr>
+        <p:txBody>
+          <a:bodyPr wrap="none" rtlCol="0">
+            <a:spAutoFit/>
+          </a:bodyPr>
+          <a:lstStyle/>
+          <a:p>
+            <a:r>
+              <a:rPr lang="en-US" dirty="0"/>
+              <a:t>Stonks</a:t>
+            </a:r>
+          </a:p>
+        </p:txBody>
+      </p:sp>
+      <p:sp>
+        <p:nvSpPr>
+          <p:cNvPr id="16" name="Rectangle 15">
+            <a:extLst>
+              <a:ext uri="{FF2B5EF4-FFF2-40B4-BE49-F238E27FC236}">
+                <a16:creationId xmlns:a16="http://schemas.microsoft.com/office/drawing/2014/main" id="{D7A7D042-ECF9-FE48-BE3C-E44415FD0F97}"/>
+              </a:ext>
+            </a:extLst>
+          </p:cNvPr>
+          <p:cNvSpPr/>
+          <p:nvPr/>
+        </p:nvSpPr>
+        <p:spPr>
+          <a:xfrm>
+            <a:off x="1781956" y="48855"/>
+            <a:ext cx="1154097" cy="310719"/>
+          </a:xfrm>
+          <a:prstGeom prst="rect">
+            <a:avLst/>
+          </a:prstGeom>
+          <a:solidFill>
+            <a:schemeClr val="tx1">
+              <a:lumMod val="50000"/>
+              <a:lumOff val="50000"/>
+            </a:schemeClr>
+          </a:solidFill>
+        </p:spPr>
+        <p:style>
+          <a:lnRef idx="2">
+            <a:schemeClr val="accent1">
+              <a:shade val="50000"/>
+            </a:schemeClr>
+          </a:lnRef>
+          <a:fillRef idx="1">
+            <a:schemeClr val="accent1"/>
+          </a:fillRef>
+          <a:effectRef idx="0">
+            <a:schemeClr val="accent1"/>
+          </a:effectRef>
+          <a:fontRef idx="minor">
+            <a:schemeClr val="lt1"/>
+          </a:fontRef>
+        </p:style>
+        <p:txBody>
+          <a:bodyPr rtlCol="0" anchor="ctr"/>
+          <a:lstStyle/>
+          <a:p>
+            <a:pPr algn="ctr"/>
+            <a:r>
+              <a:rPr lang="en-US" dirty="0"/>
+              <a:t>Stonks</a:t>
+            </a:r>
+          </a:p>
+        </p:txBody>
+      </p:sp>
+      <p:sp>
+        <p:nvSpPr>
+          <p:cNvPr id="22" name="Rectangle 21">
+            <a:extLst>
+              <a:ext uri="{FF2B5EF4-FFF2-40B4-BE49-F238E27FC236}">
+                <a16:creationId xmlns:a16="http://schemas.microsoft.com/office/drawing/2014/main" id="{092AC19D-5FDF-304A-831A-735B4D6BC089}"/>
+              </a:ext>
+            </a:extLst>
+          </p:cNvPr>
+          <p:cNvSpPr/>
+          <p:nvPr/>
+        </p:nvSpPr>
+        <p:spPr>
+          <a:xfrm>
+            <a:off x="3259945" y="20475"/>
+            <a:ext cx="1154097" cy="310719"/>
+          </a:xfrm>
+          <a:prstGeom prst="rect">
+            <a:avLst/>
+          </a:prstGeom>
+          <a:solidFill>
+            <a:schemeClr val="tx1">
+              <a:lumMod val="50000"/>
+              <a:lumOff val="50000"/>
+            </a:schemeClr>
+          </a:solidFill>
+        </p:spPr>
+        <p:style>
+          <a:lnRef idx="2">
+            <a:schemeClr val="accent1">
+              <a:shade val="50000"/>
+            </a:schemeClr>
+          </a:lnRef>
+          <a:fillRef idx="1">
+            <a:schemeClr val="accent1"/>
+          </a:fillRef>
+          <a:effectRef idx="0">
+            <a:schemeClr val="accent1"/>
+          </a:effectRef>
+          <a:fontRef idx="minor">
+            <a:schemeClr val="lt1"/>
+          </a:fontRef>
+        </p:style>
+        <p:txBody>
+          <a:bodyPr rtlCol="0" anchor="ctr"/>
+          <a:lstStyle/>
+          <a:p>
+            <a:pPr algn="ctr"/>
+            <a:r>
+              <a:rPr lang="en-US" dirty="0"/>
+              <a:t>About</a:t>
+            </a:r>
+          </a:p>
+        </p:txBody>
+      </p:sp>
+      <p:sp>
+        <p:nvSpPr>
+          <p:cNvPr id="24" name="Rectangle 23">
+            <a:extLst>
+              <a:ext uri="{FF2B5EF4-FFF2-40B4-BE49-F238E27FC236}">
+                <a16:creationId xmlns:a16="http://schemas.microsoft.com/office/drawing/2014/main" id="{C4BB3CE1-1AC3-AF46-9CE3-202F59BCC59E}"/>
+              </a:ext>
+            </a:extLst>
+          </p:cNvPr>
+          <p:cNvSpPr/>
+          <p:nvPr/>
+        </p:nvSpPr>
+        <p:spPr>
+          <a:xfrm>
+            <a:off x="4704244" y="35622"/>
+            <a:ext cx="1154097" cy="310719"/>
+          </a:xfrm>
+          <a:prstGeom prst="rect">
+            <a:avLst/>
+          </a:prstGeom>
+          <a:solidFill>
+            <a:schemeClr val="tx1">
+              <a:lumMod val="50000"/>
+              <a:lumOff val="50000"/>
+            </a:schemeClr>
+          </a:solidFill>
+        </p:spPr>
+        <p:style>
+          <a:lnRef idx="2">
+            <a:schemeClr val="accent1">
+              <a:shade val="50000"/>
+            </a:schemeClr>
+          </a:lnRef>
+          <a:fillRef idx="1">
+            <a:schemeClr val="accent1"/>
+          </a:fillRef>
+          <a:effectRef idx="0">
+            <a:schemeClr val="accent1"/>
+          </a:effectRef>
+          <a:fontRef idx="minor">
+            <a:schemeClr val="lt1"/>
+          </a:fontRef>
+        </p:style>
+        <p:txBody>
+          <a:bodyPr rtlCol="0" anchor="ctr"/>
+          <a:lstStyle/>
+          <a:p>
+            <a:pPr algn="ctr"/>
+            <a:r>
+              <a:rPr lang="en-US" dirty="0"/>
+              <a:t>Donate</a:t>
+            </a:r>
+          </a:p>
+        </p:txBody>
+      </p:sp>
+      <p:sp>
+        <p:nvSpPr>
+          <p:cNvPr id="25" name="Rectangle 24">
+            <a:extLst>
+              <a:ext uri="{FF2B5EF4-FFF2-40B4-BE49-F238E27FC236}">
+                <a16:creationId xmlns:a16="http://schemas.microsoft.com/office/drawing/2014/main" id="{CED07B40-0E5C-C646-88BF-7D25D3EF3F18}"/>
+              </a:ext>
+            </a:extLst>
+          </p:cNvPr>
+          <p:cNvSpPr/>
+          <p:nvPr/>
+        </p:nvSpPr>
+        <p:spPr>
+          <a:xfrm>
+            <a:off x="154280" y="1397933"/>
+            <a:ext cx="1239514" cy="308919"/>
+          </a:xfrm>
+          <a:prstGeom prst="rect">
+            <a:avLst/>
+          </a:prstGeom>
+          <a:noFill/>
+          <a:ln>
+            <a:solidFill>
+              <a:schemeClr val="accent1"/>
+            </a:solidFill>
+          </a:ln>
+        </p:spPr>
+        <p:style>
+          <a:lnRef idx="2">
+            <a:schemeClr val="accent1">
+              <a:shade val="50000"/>
+            </a:schemeClr>
+          </a:lnRef>
+          <a:fillRef idx="1">
+            <a:schemeClr val="accent1"/>
+          </a:fillRef>
+          <a:effectRef idx="0">
+            <a:schemeClr val="accent1"/>
+          </a:effectRef>
+          <a:fontRef idx="minor">
+            <a:schemeClr val="lt1"/>
+          </a:fontRef>
+        </p:style>
+        <p:txBody>
+          <a:bodyPr rtlCol="0" anchor="ctr"/>
+          <a:lstStyle/>
+          <a:p>
+            <a:r>
+              <a:rPr lang="en-US" dirty="0">
+                <a:solidFill>
+                  <a:schemeClr val="tx1"/>
+                </a:solidFill>
+              </a:rPr>
+              <a:t>Enter %</a:t>
+            </a:r>
+          </a:p>
+        </p:txBody>
+      </p:sp>
+      <p:sp>
+        <p:nvSpPr>
+          <p:cNvPr id="26" name="Rectangle 25">
+            <a:extLst>
+              <a:ext uri="{FF2B5EF4-FFF2-40B4-BE49-F238E27FC236}">
+                <a16:creationId xmlns:a16="http://schemas.microsoft.com/office/drawing/2014/main" id="{637E906B-863D-4D44-8B04-00CC39E3BD69}"/>
+              </a:ext>
+            </a:extLst>
+          </p:cNvPr>
+          <p:cNvSpPr/>
+          <p:nvPr/>
+        </p:nvSpPr>
+        <p:spPr>
+          <a:xfrm>
+            <a:off x="1781956" y="2182599"/>
+            <a:ext cx="4752009" cy="863074"/>
+          </a:xfrm>
+          <a:prstGeom prst="rect">
+            <a:avLst/>
+          </a:prstGeom>
+          <a:noFill/>
+          <a:ln>
+            <a:solidFill>
+              <a:schemeClr val="accent1"/>
+            </a:solidFill>
+          </a:ln>
+        </p:spPr>
+        <p:style>
+          <a:lnRef idx="2">
+            <a:schemeClr val="accent1">
+              <a:shade val="50000"/>
+            </a:schemeClr>
+          </a:lnRef>
+          <a:fillRef idx="1">
+            <a:schemeClr val="accent1"/>
+          </a:fillRef>
+          <a:effectRef idx="0">
+            <a:schemeClr val="accent1"/>
+          </a:effectRef>
+          <a:fontRef idx="minor">
+            <a:schemeClr val="lt1"/>
+          </a:fontRef>
+        </p:style>
+        <p:txBody>
+          <a:bodyPr rtlCol="0" anchor="t"/>
+          <a:lstStyle/>
+          <a:p>
+            <a:r>
+              <a:rPr lang="en-US" dirty="0">
+                <a:solidFill>
+                  <a:schemeClr val="tx1"/>
+                </a:solidFill>
+              </a:rPr>
+              <a:t>Optimal portfolio</a:t>
+            </a:r>
+          </a:p>
+        </p:txBody>
+      </p:sp>
+      <p:sp>
+        <p:nvSpPr>
+          <p:cNvPr id="27" name="Rectangle 26">
+            <a:extLst>
+              <a:ext uri="{FF2B5EF4-FFF2-40B4-BE49-F238E27FC236}">
+                <a16:creationId xmlns:a16="http://schemas.microsoft.com/office/drawing/2014/main" id="{0F1592ED-604D-E945-BA75-7500F791B7F8}"/>
+              </a:ext>
+            </a:extLst>
+          </p:cNvPr>
+          <p:cNvSpPr/>
+          <p:nvPr/>
+        </p:nvSpPr>
+        <p:spPr>
+          <a:xfrm>
+            <a:off x="1781956" y="3245695"/>
+            <a:ext cx="4752009" cy="863074"/>
+          </a:xfrm>
+          <a:prstGeom prst="rect">
+            <a:avLst/>
+          </a:prstGeom>
+          <a:noFill/>
+          <a:ln>
+            <a:solidFill>
+              <a:schemeClr val="accent1"/>
+            </a:solidFill>
+          </a:ln>
+        </p:spPr>
+        <p:style>
+          <a:lnRef idx="2">
+            <a:schemeClr val="accent1">
+              <a:shade val="50000"/>
+            </a:schemeClr>
+          </a:lnRef>
+          <a:fillRef idx="1">
+            <a:schemeClr val="accent1"/>
+          </a:fillRef>
+          <a:effectRef idx="0">
+            <a:schemeClr val="accent1"/>
+          </a:effectRef>
+          <a:fontRef idx="minor">
+            <a:schemeClr val="lt1"/>
+          </a:fontRef>
+        </p:style>
+        <p:txBody>
+          <a:bodyPr rtlCol="0" anchor="t"/>
+          <a:lstStyle/>
+          <a:p>
+            <a:r>
+              <a:rPr lang="en-US" dirty="0">
+                <a:solidFill>
+                  <a:schemeClr val="tx1"/>
+                </a:solidFill>
+              </a:rPr>
+              <a:t>Minimum variance portfolio</a:t>
+            </a:r>
+          </a:p>
+        </p:txBody>
+      </p:sp>
+      <p:sp>
+        <p:nvSpPr>
+          <p:cNvPr id="29" name="TextBox 28">
+            <a:extLst>
+              <a:ext uri="{FF2B5EF4-FFF2-40B4-BE49-F238E27FC236}">
+                <a16:creationId xmlns:a16="http://schemas.microsoft.com/office/drawing/2014/main" id="{9C2CEB56-995A-A643-AED9-83010A7674E0}"/>
+              </a:ext>
+            </a:extLst>
+          </p:cNvPr>
+          <p:cNvSpPr txBox="1"/>
+          <p:nvPr/>
+        </p:nvSpPr>
+        <p:spPr>
+          <a:xfrm>
+            <a:off x="1781956" y="2993021"/>
+            <a:ext cx="886076" cy="276999"/>
+          </a:xfrm>
+          <a:prstGeom prst="rect">
+            <a:avLst/>
+          </a:prstGeom>
+          <a:noFill/>
+        </p:spPr>
+        <p:txBody>
+          <a:bodyPr wrap="none" rtlCol="0">
+            <a:spAutoFit/>
+          </a:bodyPr>
+          <a:lstStyle/>
+          <a:p>
+            <a:r>
+              <a:rPr lang="en-US" sz="1200" i="1" dirty="0"/>
+              <a:t>Description</a:t>
+            </a:r>
+          </a:p>
+        </p:txBody>
+      </p:sp>
+      <p:sp>
+        <p:nvSpPr>
+          <p:cNvPr id="30" name="TextBox 29">
+            <a:extLst>
+              <a:ext uri="{FF2B5EF4-FFF2-40B4-BE49-F238E27FC236}">
+                <a16:creationId xmlns:a16="http://schemas.microsoft.com/office/drawing/2014/main" id="{5EF88119-A0A6-5C45-B0EF-285D4DE6EB05}"/>
+              </a:ext>
+            </a:extLst>
+          </p:cNvPr>
+          <p:cNvSpPr txBox="1"/>
+          <p:nvPr/>
+        </p:nvSpPr>
+        <p:spPr>
+          <a:xfrm>
+            <a:off x="1781956" y="4075388"/>
+            <a:ext cx="886076" cy="276999"/>
+          </a:xfrm>
+          <a:prstGeom prst="rect">
+            <a:avLst/>
+          </a:prstGeom>
+          <a:noFill/>
+        </p:spPr>
+        <p:txBody>
+          <a:bodyPr wrap="none" rtlCol="0">
+            <a:spAutoFit/>
+          </a:bodyPr>
+          <a:lstStyle/>
+          <a:p>
+            <a:r>
+              <a:rPr lang="en-US" sz="1200" i="1" dirty="0"/>
+              <a:t>Description</a:t>
+            </a:r>
+          </a:p>
+        </p:txBody>
+      </p:sp>
+      <p:sp>
+        <p:nvSpPr>
+          <p:cNvPr id="31" name="TextBox 30">
+            <a:extLst>
+              <a:ext uri="{FF2B5EF4-FFF2-40B4-BE49-F238E27FC236}">
+                <a16:creationId xmlns:a16="http://schemas.microsoft.com/office/drawing/2014/main" id="{2D6AB181-8786-7344-A317-95CE63EC6CBA}"/>
+              </a:ext>
+            </a:extLst>
+          </p:cNvPr>
+          <p:cNvSpPr txBox="1"/>
+          <p:nvPr/>
+        </p:nvSpPr>
+        <p:spPr>
+          <a:xfrm>
+            <a:off x="6788551" y="4075388"/>
+            <a:ext cx="886076" cy="276999"/>
+          </a:xfrm>
+          <a:prstGeom prst="rect">
+            <a:avLst/>
+          </a:prstGeom>
+          <a:noFill/>
+        </p:spPr>
+        <p:txBody>
+          <a:bodyPr wrap="none" rtlCol="0">
+            <a:spAutoFit/>
+          </a:bodyPr>
+          <a:lstStyle/>
+          <a:p>
+            <a:r>
+              <a:rPr lang="en-US" sz="1200" i="1" dirty="0"/>
+              <a:t>Description</a:t>
+            </a:r>
+          </a:p>
+        </p:txBody>
+      </p:sp>
+      <p:graphicFrame>
+        <p:nvGraphicFramePr>
+          <p:cNvPr id="32" name="Table 32">
+            <a:extLst>
+              <a:ext uri="{FF2B5EF4-FFF2-40B4-BE49-F238E27FC236}">
+                <a16:creationId xmlns:a16="http://schemas.microsoft.com/office/drawing/2014/main" id="{C7F279B2-39E9-2749-AF52-91B31D4D5CF4}"/>
+              </a:ext>
+            </a:extLst>
+          </p:cNvPr>
+          <p:cNvGraphicFramePr>
+            <a:graphicFrameLocks noGrp="1"/>
+          </p:cNvGraphicFramePr>
+          <p:nvPr>
+            <p:extLst>
+              <p:ext uri="{D42A27DB-BD31-4B8C-83A1-F6EECF244321}">
+                <p14:modId xmlns:p14="http://schemas.microsoft.com/office/powerpoint/2010/main" val="3090403348"/>
+              </p:ext>
+            </p:extLst>
+          </p:nvPr>
+        </p:nvGraphicFramePr>
+        <p:xfrm>
+          <a:off x="2197278" y="2490209"/>
+          <a:ext cx="2977965" cy="502920"/>
+        </p:xfrm>
+        <a:graphic>
+          <a:graphicData uri="http://schemas.openxmlformats.org/drawingml/2006/table">
+            <a:tbl>
+              <a:tblPr firstRow="1" bandRow="1">
+                <a:tableStyleId>{5C22544A-7EE6-4342-B048-85BDC9FD1C3A}</a:tableStyleId>
+              </a:tblPr>
+              <a:tblGrid>
+                <a:gridCol w="595593">
+                  <a:extLst>
+                    <a:ext uri="{9D8B030D-6E8A-4147-A177-3AD203B41FA5}">
+                      <a16:colId xmlns:a16="http://schemas.microsoft.com/office/drawing/2014/main" val="3656054256"/>
+                    </a:ext>
+                  </a:extLst>
+                </a:gridCol>
+                <a:gridCol w="595593">
+                  <a:extLst>
+                    <a:ext uri="{9D8B030D-6E8A-4147-A177-3AD203B41FA5}">
+                      <a16:colId xmlns:a16="http://schemas.microsoft.com/office/drawing/2014/main" val="1660544214"/>
+                    </a:ext>
+                  </a:extLst>
+                </a:gridCol>
+                <a:gridCol w="595593">
+                  <a:extLst>
+                    <a:ext uri="{9D8B030D-6E8A-4147-A177-3AD203B41FA5}">
+                      <a16:colId xmlns:a16="http://schemas.microsoft.com/office/drawing/2014/main" val="262625640"/>
+                    </a:ext>
+                  </a:extLst>
+                </a:gridCol>
+                <a:gridCol w="595593">
+                  <a:extLst>
+                    <a:ext uri="{9D8B030D-6E8A-4147-A177-3AD203B41FA5}">
+                      <a16:colId xmlns:a16="http://schemas.microsoft.com/office/drawing/2014/main" val="660161759"/>
+                    </a:ext>
+                  </a:extLst>
+                </a:gridCol>
+                <a:gridCol w="595593">
+                  <a:extLst>
+                    <a:ext uri="{9D8B030D-6E8A-4147-A177-3AD203B41FA5}">
+                      <a16:colId xmlns:a16="http://schemas.microsoft.com/office/drawing/2014/main" val="4057329463"/>
+                    </a:ext>
+                  </a:extLst>
+                </a:gridCol>
+              </a:tblGrid>
+              <a:tr h="138500">
+                <a:tc>
+                  <a:txBody>
+                    <a:bodyPr/>
+                    <a:lstStyle/>
+                    <a:p>
+                      <a:r>
+                        <a:rPr lang="en-US" sz="500" dirty="0"/>
+                        <a:t>APT</a:t>
+                      </a:r>
+                    </a:p>
+                  </a:txBody>
+                  <a:tcPr/>
+                </a:tc>
+                <a:tc>
+                  <a:txBody>
+                    <a:bodyPr/>
+                    <a:lstStyle/>
+                    <a:p>
+                      <a:r>
+                        <a:rPr lang="en-US" sz="500" dirty="0"/>
+                        <a:t>Z1P</a:t>
+                      </a:r>
+                    </a:p>
+                  </a:txBody>
+                  <a:tcPr/>
+                </a:tc>
+                <a:tc>
+                  <a:txBody>
+                    <a:bodyPr/>
+                    <a:lstStyle/>
+                    <a:p>
+                      <a:endParaRPr lang="en-US" sz="500" dirty="0"/>
+                    </a:p>
+                  </a:txBody>
+                  <a:tcPr/>
+                </a:tc>
+                <a:tc>
+                  <a:txBody>
+                    <a:bodyPr/>
+                    <a:lstStyle/>
+                    <a:p>
+                      <a:endParaRPr lang="en-US" sz="500"/>
+                    </a:p>
+                  </a:txBody>
+                  <a:tcPr/>
+                </a:tc>
+                <a:tc>
+                  <a:txBody>
+                    <a:bodyPr/>
+                    <a:lstStyle/>
+                    <a:p>
+                      <a:endParaRPr lang="en-US" sz="500"/>
+                    </a:p>
+                  </a:txBody>
+                  <a:tcPr/>
+                </a:tc>
+                <a:extLst>
+                  <a:ext uri="{0D108BD9-81ED-4DB2-BD59-A6C34878D82A}">
+                    <a16:rowId xmlns:a16="http://schemas.microsoft.com/office/drawing/2014/main" val="3356337232"/>
+                  </a:ext>
+                </a:extLst>
+              </a:tr>
+              <a:tr h="0">
+                <a:tc>
+                  <a:txBody>
+                    <a:bodyPr/>
+                    <a:lstStyle/>
+                    <a:p>
+                      <a:r>
+                        <a:rPr lang="en-US" sz="500" dirty="0"/>
+                        <a:t>50%</a:t>
+                      </a:r>
+                    </a:p>
+                  </a:txBody>
+                  <a:tcPr/>
+                </a:tc>
+                <a:tc>
+                  <a:txBody>
+                    <a:bodyPr/>
+                    <a:lstStyle/>
+                    <a:p>
+                      <a:r>
+                        <a:rPr lang="en-US" sz="500" dirty="0"/>
+                        <a:t>30%</a:t>
+                      </a:r>
+                    </a:p>
+                  </a:txBody>
+                  <a:tcPr/>
+                </a:tc>
+                <a:tc>
+                  <a:txBody>
+                    <a:bodyPr/>
+                    <a:lstStyle/>
+                    <a:p>
+                      <a:endParaRPr lang="en-US" sz="500" dirty="0"/>
+                    </a:p>
+                  </a:txBody>
+                  <a:tcPr/>
+                </a:tc>
+                <a:tc>
+                  <a:txBody>
+                    <a:bodyPr/>
+                    <a:lstStyle/>
+                    <a:p>
+                      <a:endParaRPr lang="en-US" sz="500" dirty="0"/>
+                    </a:p>
+                  </a:txBody>
+                  <a:tcPr/>
+                </a:tc>
+                <a:tc>
+                  <a:txBody>
+                    <a:bodyPr/>
+                    <a:lstStyle/>
+                    <a:p>
+                      <a:endParaRPr lang="en-US" sz="500" dirty="0"/>
+                    </a:p>
+                  </a:txBody>
+                  <a:tcPr/>
+                </a:tc>
+                <a:extLst>
+                  <a:ext uri="{0D108BD9-81ED-4DB2-BD59-A6C34878D82A}">
+                    <a16:rowId xmlns:a16="http://schemas.microsoft.com/office/drawing/2014/main" val="4246599908"/>
+                  </a:ext>
+                </a:extLst>
+              </a:tr>
+              <a:tr h="0">
+                <a:tc>
+                  <a:txBody>
+                    <a:bodyPr/>
+                    <a:lstStyle/>
+                    <a:p>
+                      <a:r>
+                        <a:rPr lang="en-US" sz="500" dirty="0"/>
+                        <a:t>$500</a:t>
+                      </a:r>
+                    </a:p>
+                  </a:txBody>
+                  <a:tcPr/>
+                </a:tc>
+                <a:tc>
+                  <a:txBody>
+                    <a:bodyPr/>
+                    <a:lstStyle/>
+                    <a:p>
+                      <a:r>
+                        <a:rPr lang="en-US" sz="500" dirty="0"/>
+                        <a:t>$300</a:t>
+                      </a:r>
+                    </a:p>
+                  </a:txBody>
+                  <a:tcPr/>
+                </a:tc>
+                <a:tc>
+                  <a:txBody>
+                    <a:bodyPr/>
+                    <a:lstStyle/>
+                    <a:p>
+                      <a:endParaRPr lang="en-US" sz="500" dirty="0"/>
+                    </a:p>
+                  </a:txBody>
+                  <a:tcPr/>
+                </a:tc>
+                <a:tc>
+                  <a:txBody>
+                    <a:bodyPr/>
+                    <a:lstStyle/>
+                    <a:p>
+                      <a:endParaRPr lang="en-US" sz="500" dirty="0"/>
+                    </a:p>
+                  </a:txBody>
+                  <a:tcPr/>
+                </a:tc>
+                <a:tc>
+                  <a:txBody>
+                    <a:bodyPr/>
+                    <a:lstStyle/>
+                    <a:p>
+                      <a:endParaRPr lang="en-US" sz="500" dirty="0"/>
+                    </a:p>
+                  </a:txBody>
+                  <a:tcPr/>
+                </a:tc>
+                <a:extLst>
+                  <a:ext uri="{0D108BD9-81ED-4DB2-BD59-A6C34878D82A}">
+                    <a16:rowId xmlns:a16="http://schemas.microsoft.com/office/drawing/2014/main" val="4106522993"/>
+                  </a:ext>
+                </a:extLst>
+              </a:tr>
+            </a:tbl>
+          </a:graphicData>
+        </a:graphic>
+      </p:graphicFrame>
+      <p:sp>
+        <p:nvSpPr>
+          <p:cNvPr id="33" name="Rectangle 32">
+            <a:extLst>
+              <a:ext uri="{FF2B5EF4-FFF2-40B4-BE49-F238E27FC236}">
+                <a16:creationId xmlns:a16="http://schemas.microsoft.com/office/drawing/2014/main" id="{EBD4ACE8-A2F7-1748-814E-F266072BC274}"/>
+              </a:ext>
+            </a:extLst>
+          </p:cNvPr>
+          <p:cNvSpPr/>
+          <p:nvPr/>
+        </p:nvSpPr>
+        <p:spPr>
+          <a:xfrm>
+            <a:off x="154280" y="2071308"/>
+            <a:ext cx="1239514" cy="308919"/>
+          </a:xfrm>
+          <a:prstGeom prst="rect">
+            <a:avLst/>
+          </a:prstGeom>
+          <a:noFill/>
+          <a:ln>
+            <a:solidFill>
+              <a:schemeClr val="accent1"/>
+            </a:solidFill>
+          </a:ln>
+        </p:spPr>
+        <p:style>
+          <a:lnRef idx="2">
+            <a:schemeClr val="accent1">
+              <a:shade val="50000"/>
+            </a:schemeClr>
+          </a:lnRef>
+          <a:fillRef idx="1">
+            <a:schemeClr val="accent1"/>
+          </a:fillRef>
+          <a:effectRef idx="0">
+            <a:schemeClr val="accent1"/>
+          </a:effectRef>
+          <a:fontRef idx="minor">
+            <a:schemeClr val="lt1"/>
+          </a:fontRef>
+        </p:style>
+        <p:txBody>
+          <a:bodyPr rtlCol="0" anchor="ctr"/>
+          <a:lstStyle/>
+          <a:p>
+            <a:r>
+              <a:rPr lang="en-US" dirty="0">
+                <a:solidFill>
+                  <a:schemeClr val="tx1"/>
+                </a:solidFill>
+              </a:rPr>
+              <a:t>Enter $</a:t>
+            </a:r>
+          </a:p>
+        </p:txBody>
+      </p:sp>
+      <p:graphicFrame>
+        <p:nvGraphicFramePr>
+          <p:cNvPr id="34" name="Table 32">
+            <a:extLst>
+              <a:ext uri="{FF2B5EF4-FFF2-40B4-BE49-F238E27FC236}">
+                <a16:creationId xmlns:a16="http://schemas.microsoft.com/office/drawing/2014/main" id="{CF758E81-AEFC-9E47-BF25-3A4CD082FC1B}"/>
+              </a:ext>
+            </a:extLst>
+          </p:cNvPr>
+          <p:cNvGraphicFramePr>
+            <a:graphicFrameLocks noGrp="1"/>
+          </p:cNvGraphicFramePr>
+          <p:nvPr>
+            <p:extLst>
+              <p:ext uri="{D42A27DB-BD31-4B8C-83A1-F6EECF244321}">
+                <p14:modId xmlns:p14="http://schemas.microsoft.com/office/powerpoint/2010/main" val="463761012"/>
+              </p:ext>
+            </p:extLst>
+          </p:nvPr>
+        </p:nvGraphicFramePr>
+        <p:xfrm>
+          <a:off x="2194311" y="3560211"/>
+          <a:ext cx="2977965" cy="502920"/>
+        </p:xfrm>
+        <a:graphic>
+          <a:graphicData uri="http://schemas.openxmlformats.org/drawingml/2006/table">
+            <a:tbl>
+              <a:tblPr firstRow="1" bandRow="1">
+                <a:tableStyleId>{5C22544A-7EE6-4342-B048-85BDC9FD1C3A}</a:tableStyleId>
+              </a:tblPr>
+              <a:tblGrid>
+                <a:gridCol w="595593">
+                  <a:extLst>
+                    <a:ext uri="{9D8B030D-6E8A-4147-A177-3AD203B41FA5}">
+                      <a16:colId xmlns:a16="http://schemas.microsoft.com/office/drawing/2014/main" val="3656054256"/>
+                    </a:ext>
+                  </a:extLst>
+                </a:gridCol>
+                <a:gridCol w="595593">
+                  <a:extLst>
+                    <a:ext uri="{9D8B030D-6E8A-4147-A177-3AD203B41FA5}">
+                      <a16:colId xmlns:a16="http://schemas.microsoft.com/office/drawing/2014/main" val="1660544214"/>
+                    </a:ext>
+                  </a:extLst>
+                </a:gridCol>
+                <a:gridCol w="595593">
+                  <a:extLst>
+                    <a:ext uri="{9D8B030D-6E8A-4147-A177-3AD203B41FA5}">
+                      <a16:colId xmlns:a16="http://schemas.microsoft.com/office/drawing/2014/main" val="262625640"/>
+                    </a:ext>
+                  </a:extLst>
+                </a:gridCol>
+                <a:gridCol w="595593">
+                  <a:extLst>
+                    <a:ext uri="{9D8B030D-6E8A-4147-A177-3AD203B41FA5}">
+                      <a16:colId xmlns:a16="http://schemas.microsoft.com/office/drawing/2014/main" val="660161759"/>
+                    </a:ext>
+                  </a:extLst>
+                </a:gridCol>
+                <a:gridCol w="595593">
+                  <a:extLst>
+                    <a:ext uri="{9D8B030D-6E8A-4147-A177-3AD203B41FA5}">
+                      <a16:colId xmlns:a16="http://schemas.microsoft.com/office/drawing/2014/main" val="4057329463"/>
+                    </a:ext>
+                  </a:extLst>
+                </a:gridCol>
+              </a:tblGrid>
+              <a:tr h="138500">
+                <a:tc>
+                  <a:txBody>
+                    <a:bodyPr/>
+                    <a:lstStyle/>
+                    <a:p>
+                      <a:r>
+                        <a:rPr lang="en-US" sz="500" dirty="0"/>
+                        <a:t>APT</a:t>
+                      </a:r>
+                    </a:p>
+                  </a:txBody>
+                  <a:tcPr/>
+                </a:tc>
+                <a:tc>
+                  <a:txBody>
+                    <a:bodyPr/>
+                    <a:lstStyle/>
+                    <a:p>
+                      <a:r>
+                        <a:rPr lang="en-US" sz="500" dirty="0"/>
+                        <a:t>Z1P</a:t>
+                      </a:r>
+                    </a:p>
+                  </a:txBody>
+                  <a:tcPr/>
+                </a:tc>
+                <a:tc>
+                  <a:txBody>
+                    <a:bodyPr/>
+                    <a:lstStyle/>
+                    <a:p>
+                      <a:endParaRPr lang="en-US" sz="500" dirty="0"/>
+                    </a:p>
+                  </a:txBody>
+                  <a:tcPr/>
+                </a:tc>
+                <a:tc>
+                  <a:txBody>
+                    <a:bodyPr/>
+                    <a:lstStyle/>
+                    <a:p>
+                      <a:endParaRPr lang="en-US" sz="500"/>
+                    </a:p>
+                  </a:txBody>
+                  <a:tcPr/>
+                </a:tc>
+                <a:tc>
+                  <a:txBody>
+                    <a:bodyPr/>
+                    <a:lstStyle/>
+                    <a:p>
+                      <a:endParaRPr lang="en-US" sz="500"/>
+                    </a:p>
+                  </a:txBody>
+                  <a:tcPr/>
+                </a:tc>
+                <a:extLst>
+                  <a:ext uri="{0D108BD9-81ED-4DB2-BD59-A6C34878D82A}">
+                    <a16:rowId xmlns:a16="http://schemas.microsoft.com/office/drawing/2014/main" val="3356337232"/>
+                  </a:ext>
+                </a:extLst>
+              </a:tr>
+              <a:tr h="0">
+                <a:tc>
+                  <a:txBody>
+                    <a:bodyPr/>
+                    <a:lstStyle/>
+                    <a:p>
+                      <a:r>
+                        <a:rPr lang="en-US" sz="500" dirty="0"/>
+                        <a:t>50%</a:t>
+                      </a:r>
+                    </a:p>
+                  </a:txBody>
+                  <a:tcPr/>
+                </a:tc>
+                <a:tc>
+                  <a:txBody>
+                    <a:bodyPr/>
+                    <a:lstStyle/>
+                    <a:p>
+                      <a:r>
+                        <a:rPr lang="en-US" sz="500" dirty="0"/>
+                        <a:t>30%</a:t>
+                      </a:r>
+                    </a:p>
+                  </a:txBody>
+                  <a:tcPr/>
+                </a:tc>
+                <a:tc>
+                  <a:txBody>
+                    <a:bodyPr/>
+                    <a:lstStyle/>
+                    <a:p>
+                      <a:endParaRPr lang="en-US" sz="500" dirty="0"/>
+                    </a:p>
+                  </a:txBody>
+                  <a:tcPr/>
+                </a:tc>
+                <a:tc>
+                  <a:txBody>
+                    <a:bodyPr/>
+                    <a:lstStyle/>
+                    <a:p>
+                      <a:endParaRPr lang="en-US" sz="500" dirty="0"/>
+                    </a:p>
+                  </a:txBody>
+                  <a:tcPr/>
+                </a:tc>
+                <a:tc>
+                  <a:txBody>
+                    <a:bodyPr/>
+                    <a:lstStyle/>
+                    <a:p>
+                      <a:endParaRPr lang="en-US" sz="500" dirty="0"/>
+                    </a:p>
+                  </a:txBody>
+                  <a:tcPr/>
+                </a:tc>
+                <a:extLst>
+                  <a:ext uri="{0D108BD9-81ED-4DB2-BD59-A6C34878D82A}">
+                    <a16:rowId xmlns:a16="http://schemas.microsoft.com/office/drawing/2014/main" val="4246599908"/>
+                  </a:ext>
+                </a:extLst>
+              </a:tr>
+              <a:tr h="0">
+                <a:tc>
+                  <a:txBody>
+                    <a:bodyPr/>
+                    <a:lstStyle/>
+                    <a:p>
+                      <a:r>
+                        <a:rPr lang="en-US" sz="500" dirty="0"/>
+                        <a:t>$500</a:t>
+                      </a:r>
+                    </a:p>
+                  </a:txBody>
+                  <a:tcPr/>
+                </a:tc>
+                <a:tc>
+                  <a:txBody>
+                    <a:bodyPr/>
+                    <a:lstStyle/>
+                    <a:p>
+                      <a:r>
+                        <a:rPr lang="en-US" sz="500" dirty="0"/>
+                        <a:t>$300</a:t>
+                      </a:r>
+                    </a:p>
+                  </a:txBody>
+                  <a:tcPr/>
+                </a:tc>
+                <a:tc>
+                  <a:txBody>
+                    <a:bodyPr/>
+                    <a:lstStyle/>
+                    <a:p>
+                      <a:endParaRPr lang="en-US" sz="500" dirty="0"/>
+                    </a:p>
+                  </a:txBody>
+                  <a:tcPr/>
+                </a:tc>
+                <a:tc>
+                  <a:txBody>
+                    <a:bodyPr/>
+                    <a:lstStyle/>
+                    <a:p>
+                      <a:endParaRPr lang="en-US" sz="500" dirty="0"/>
+                    </a:p>
+                  </a:txBody>
+                  <a:tcPr/>
+                </a:tc>
+                <a:tc>
+                  <a:txBody>
+                    <a:bodyPr/>
+                    <a:lstStyle/>
+                    <a:p>
+                      <a:endParaRPr lang="en-US" sz="500" dirty="0"/>
+                    </a:p>
+                  </a:txBody>
+                  <a:tcPr/>
+                </a:tc>
+                <a:extLst>
+                  <a:ext uri="{0D108BD9-81ED-4DB2-BD59-A6C34878D82A}">
+                    <a16:rowId xmlns:a16="http://schemas.microsoft.com/office/drawing/2014/main" val="4106522993"/>
+                  </a:ext>
+                </a:extLst>
+              </a:tr>
+            </a:tbl>
+          </a:graphicData>
+        </a:graphic>
+      </p:graphicFrame>
+      <p:sp>
+        <p:nvSpPr>
+          <p:cNvPr id="35" name="Rectangle 34">
+            <a:extLst>
+              <a:ext uri="{FF2B5EF4-FFF2-40B4-BE49-F238E27FC236}">
+                <a16:creationId xmlns:a16="http://schemas.microsoft.com/office/drawing/2014/main" id="{95C316A6-D8EE-AF4D-BEEC-6FC04C6FD741}"/>
+              </a:ext>
+            </a:extLst>
+          </p:cNvPr>
+          <p:cNvSpPr/>
+          <p:nvPr/>
+        </p:nvSpPr>
+        <p:spPr>
+          <a:xfrm>
+            <a:off x="1781956" y="4380222"/>
+            <a:ext cx="4795125" cy="1368556"/>
+          </a:xfrm>
+          <a:prstGeom prst="rect">
+            <a:avLst/>
+          </a:prstGeom>
+          <a:noFill/>
+          <a:ln>
+            <a:solidFill>
+              <a:schemeClr val="accent1"/>
+            </a:solidFill>
+          </a:ln>
+        </p:spPr>
+        <p:style>
+          <a:lnRef idx="2">
+            <a:schemeClr val="accent1">
+              <a:shade val="50000"/>
+            </a:schemeClr>
+          </a:lnRef>
+          <a:fillRef idx="1">
+            <a:schemeClr val="accent1"/>
+          </a:fillRef>
+          <a:effectRef idx="0">
+            <a:schemeClr val="accent1"/>
+          </a:effectRef>
+          <a:fontRef idx="minor">
+            <a:schemeClr val="lt1"/>
+          </a:fontRef>
+        </p:style>
+        <p:txBody>
+          <a:bodyPr rtlCol="0" anchor="ctr"/>
+          <a:lstStyle/>
+          <a:p>
+            <a:r>
+              <a:rPr lang="en-US" dirty="0">
+                <a:solidFill>
+                  <a:schemeClr val="tx1"/>
+                </a:solidFill>
+              </a:rPr>
+              <a:t>Price plot</a:t>
+            </a:r>
+          </a:p>
+        </p:txBody>
+      </p:sp>
+      <p:sp>
+        <p:nvSpPr>
+          <p:cNvPr id="36" name="Rectangle 35">
+            <a:extLst>
+              <a:ext uri="{FF2B5EF4-FFF2-40B4-BE49-F238E27FC236}">
+                <a16:creationId xmlns:a16="http://schemas.microsoft.com/office/drawing/2014/main" id="{97FCA9BD-79AF-4249-A91F-D7D77BEDF6B3}"/>
+              </a:ext>
+            </a:extLst>
+          </p:cNvPr>
+          <p:cNvSpPr/>
+          <p:nvPr/>
+        </p:nvSpPr>
+        <p:spPr>
+          <a:xfrm>
+            <a:off x="1781955" y="1368632"/>
+            <a:ext cx="9823622" cy="649227"/>
+          </a:xfrm>
+          <a:prstGeom prst="rect">
+            <a:avLst/>
+          </a:prstGeom>
+          <a:noFill/>
+          <a:ln>
+            <a:solidFill>
+              <a:schemeClr val="accent1"/>
+            </a:solidFill>
+          </a:ln>
+        </p:spPr>
+        <p:style>
+          <a:lnRef idx="2">
+            <a:schemeClr val="accent1">
+              <a:shade val="50000"/>
+            </a:schemeClr>
+          </a:lnRef>
+          <a:fillRef idx="1">
+            <a:schemeClr val="accent1"/>
+          </a:fillRef>
+          <a:effectRef idx="0">
+            <a:schemeClr val="accent1"/>
+          </a:effectRef>
+          <a:fontRef idx="minor">
+            <a:schemeClr val="lt1"/>
+          </a:fontRef>
+        </p:style>
+        <p:txBody>
+          <a:bodyPr rtlCol="0" anchor="t"/>
+          <a:lstStyle/>
+          <a:p>
+            <a:r>
+              <a:rPr lang="en-US" dirty="0">
+                <a:solidFill>
+                  <a:schemeClr val="tx1"/>
+                </a:solidFill>
+              </a:rPr>
+              <a:t>Annual returns for your stocks</a:t>
+            </a:r>
+          </a:p>
+        </p:txBody>
+      </p:sp>
+      <p:graphicFrame>
+        <p:nvGraphicFramePr>
+          <p:cNvPr id="37" name="Table 32">
+            <a:extLst>
+              <a:ext uri="{FF2B5EF4-FFF2-40B4-BE49-F238E27FC236}">
+                <a16:creationId xmlns:a16="http://schemas.microsoft.com/office/drawing/2014/main" id="{09134BEF-1ED1-7043-ACAD-455323442947}"/>
+              </a:ext>
+            </a:extLst>
+          </p:cNvPr>
+          <p:cNvGraphicFramePr>
+            <a:graphicFrameLocks noGrp="1"/>
+          </p:cNvGraphicFramePr>
+          <p:nvPr>
+            <p:extLst>
+              <p:ext uri="{D42A27DB-BD31-4B8C-83A1-F6EECF244321}">
+                <p14:modId xmlns:p14="http://schemas.microsoft.com/office/powerpoint/2010/main" val="1017999675"/>
+              </p:ext>
+            </p:extLst>
+          </p:nvPr>
+        </p:nvGraphicFramePr>
+        <p:xfrm>
+          <a:off x="3043125" y="1647297"/>
+          <a:ext cx="7366920" cy="335280"/>
+        </p:xfrm>
+        <a:graphic>
+          <a:graphicData uri="http://schemas.openxmlformats.org/drawingml/2006/table">
+            <a:tbl>
+              <a:tblPr firstRow="1" bandRow="1">
+                <a:tableStyleId>{5C22544A-7EE6-4342-B048-85BDC9FD1C3A}</a:tableStyleId>
+              </a:tblPr>
+              <a:tblGrid>
+                <a:gridCol w="1473384">
+                  <a:extLst>
+                    <a:ext uri="{9D8B030D-6E8A-4147-A177-3AD203B41FA5}">
+                      <a16:colId xmlns:a16="http://schemas.microsoft.com/office/drawing/2014/main" val="3656054256"/>
+                    </a:ext>
+                  </a:extLst>
+                </a:gridCol>
+                <a:gridCol w="1473384">
+                  <a:extLst>
+                    <a:ext uri="{9D8B030D-6E8A-4147-A177-3AD203B41FA5}">
+                      <a16:colId xmlns:a16="http://schemas.microsoft.com/office/drawing/2014/main" val="1660544214"/>
+                    </a:ext>
+                  </a:extLst>
+                </a:gridCol>
+                <a:gridCol w="1473384">
+                  <a:extLst>
+                    <a:ext uri="{9D8B030D-6E8A-4147-A177-3AD203B41FA5}">
+                      <a16:colId xmlns:a16="http://schemas.microsoft.com/office/drawing/2014/main" val="262625640"/>
+                    </a:ext>
+                  </a:extLst>
+                </a:gridCol>
+                <a:gridCol w="1473384">
+                  <a:extLst>
+                    <a:ext uri="{9D8B030D-6E8A-4147-A177-3AD203B41FA5}">
+                      <a16:colId xmlns:a16="http://schemas.microsoft.com/office/drawing/2014/main" val="660161759"/>
+                    </a:ext>
+                  </a:extLst>
+                </a:gridCol>
+                <a:gridCol w="1473384">
+                  <a:extLst>
+                    <a:ext uri="{9D8B030D-6E8A-4147-A177-3AD203B41FA5}">
+                      <a16:colId xmlns:a16="http://schemas.microsoft.com/office/drawing/2014/main" val="4057329463"/>
+                    </a:ext>
+                  </a:extLst>
+                </a:gridCol>
+              </a:tblGrid>
+              <a:tr h="156463">
+                <a:tc>
+                  <a:txBody>
+                    <a:bodyPr/>
+                    <a:lstStyle/>
+                    <a:p>
+                      <a:r>
+                        <a:rPr lang="en-US" sz="500" dirty="0"/>
+                        <a:t>APT</a:t>
+                      </a:r>
+                    </a:p>
+                  </a:txBody>
+                  <a:tcPr/>
+                </a:tc>
+                <a:tc>
+                  <a:txBody>
+                    <a:bodyPr/>
+                    <a:lstStyle/>
+                    <a:p>
+                      <a:r>
+                        <a:rPr lang="en-US" sz="500" dirty="0"/>
+                        <a:t>Z1P</a:t>
+                      </a:r>
+                    </a:p>
+                  </a:txBody>
+                  <a:tcPr/>
+                </a:tc>
+                <a:tc>
+                  <a:txBody>
+                    <a:bodyPr/>
+                    <a:lstStyle/>
+                    <a:p>
+                      <a:endParaRPr lang="en-US" sz="500" dirty="0"/>
+                    </a:p>
+                  </a:txBody>
+                  <a:tcPr/>
+                </a:tc>
+                <a:tc>
+                  <a:txBody>
+                    <a:bodyPr/>
+                    <a:lstStyle/>
+                    <a:p>
+                      <a:endParaRPr lang="en-US" sz="500"/>
+                    </a:p>
+                  </a:txBody>
+                  <a:tcPr/>
+                </a:tc>
+                <a:tc>
+                  <a:txBody>
+                    <a:bodyPr/>
+                    <a:lstStyle/>
+                    <a:p>
+                      <a:endParaRPr lang="en-US" sz="500"/>
+                    </a:p>
+                  </a:txBody>
+                  <a:tcPr/>
+                </a:tc>
+                <a:extLst>
+                  <a:ext uri="{0D108BD9-81ED-4DB2-BD59-A6C34878D82A}">
+                    <a16:rowId xmlns:a16="http://schemas.microsoft.com/office/drawing/2014/main" val="3356337232"/>
+                  </a:ext>
+                </a:extLst>
+              </a:tr>
+              <a:tr h="156463">
+                <a:tc>
+                  <a:txBody>
+                    <a:bodyPr/>
+                    <a:lstStyle/>
+                    <a:p>
+                      <a:r>
+                        <a:rPr lang="en-US" sz="500" dirty="0"/>
+                        <a:t>$500</a:t>
+                      </a:r>
+                    </a:p>
+                  </a:txBody>
+                  <a:tcPr/>
+                </a:tc>
+                <a:tc>
+                  <a:txBody>
+                    <a:bodyPr/>
+                    <a:lstStyle/>
+                    <a:p>
+                      <a:r>
+                        <a:rPr lang="en-US" sz="500" dirty="0"/>
+                        <a:t>$300</a:t>
+                      </a:r>
+                    </a:p>
+                  </a:txBody>
+                  <a:tcPr/>
+                </a:tc>
+                <a:tc>
+                  <a:txBody>
+                    <a:bodyPr/>
+                    <a:lstStyle/>
+                    <a:p>
+                      <a:endParaRPr lang="en-US" sz="500" dirty="0"/>
+                    </a:p>
+                  </a:txBody>
+                  <a:tcPr/>
+                </a:tc>
+                <a:tc>
+                  <a:txBody>
+                    <a:bodyPr/>
+                    <a:lstStyle/>
+                    <a:p>
+                      <a:endParaRPr lang="en-US" sz="500" dirty="0"/>
+                    </a:p>
+                  </a:txBody>
+                  <a:tcPr/>
+                </a:tc>
+                <a:tc>
+                  <a:txBody>
+                    <a:bodyPr/>
+                    <a:lstStyle/>
+                    <a:p>
+                      <a:endParaRPr lang="en-US" sz="500" dirty="0"/>
+                    </a:p>
+                  </a:txBody>
+                  <a:tcPr/>
+                </a:tc>
+                <a:extLst>
+                  <a:ext uri="{0D108BD9-81ED-4DB2-BD59-A6C34878D82A}">
+                    <a16:rowId xmlns:a16="http://schemas.microsoft.com/office/drawing/2014/main" val="4106522993"/>
+                  </a:ext>
+                </a:extLst>
+              </a:tr>
+            </a:tbl>
+          </a:graphicData>
+        </a:graphic>
+      </p:graphicFrame>
+      <p:sp>
+        <p:nvSpPr>
+          <p:cNvPr id="39" name="TextBox 38">
+            <a:extLst>
+              <a:ext uri="{FF2B5EF4-FFF2-40B4-BE49-F238E27FC236}">
+                <a16:creationId xmlns:a16="http://schemas.microsoft.com/office/drawing/2014/main" id="{8746660D-8240-9742-8F39-C218934ADB19}"/>
+              </a:ext>
+            </a:extLst>
+          </p:cNvPr>
+          <p:cNvSpPr txBox="1"/>
+          <p:nvPr/>
+        </p:nvSpPr>
+        <p:spPr>
+          <a:xfrm>
+            <a:off x="1745189" y="5771402"/>
+            <a:ext cx="886076" cy="276999"/>
+          </a:xfrm>
+          <a:prstGeom prst="rect">
+            <a:avLst/>
+          </a:prstGeom>
+          <a:noFill/>
+        </p:spPr>
+        <p:txBody>
+          <a:bodyPr wrap="none" rtlCol="0">
+            <a:spAutoFit/>
+          </a:bodyPr>
+          <a:lstStyle/>
+          <a:p>
+            <a:r>
+              <a:rPr lang="en-US" sz="1200" i="1" dirty="0"/>
+              <a:t>Description</a:t>
+            </a:r>
+          </a:p>
+        </p:txBody>
+      </p:sp>
+      <p:sp>
+        <p:nvSpPr>
+          <p:cNvPr id="40" name="TextBox 39">
+            <a:extLst>
+              <a:ext uri="{FF2B5EF4-FFF2-40B4-BE49-F238E27FC236}">
+                <a16:creationId xmlns:a16="http://schemas.microsoft.com/office/drawing/2014/main" id="{644BD1C4-F767-B543-819C-4EBCFE745E5B}"/>
+              </a:ext>
+            </a:extLst>
+          </p:cNvPr>
+          <p:cNvSpPr txBox="1"/>
+          <p:nvPr/>
+        </p:nvSpPr>
+        <p:spPr>
+          <a:xfrm>
+            <a:off x="6751784" y="5771402"/>
+            <a:ext cx="886076" cy="276999"/>
+          </a:xfrm>
+          <a:prstGeom prst="rect">
+            <a:avLst/>
+          </a:prstGeom>
+          <a:noFill/>
+        </p:spPr>
+        <p:txBody>
+          <a:bodyPr wrap="none" rtlCol="0">
+            <a:spAutoFit/>
+          </a:bodyPr>
+          <a:lstStyle/>
+          <a:p>
+            <a:r>
+              <a:rPr lang="en-US" sz="1200" i="1" dirty="0"/>
+              <a:t>Description</a:t>
+            </a:r>
+          </a:p>
+        </p:txBody>
+      </p:sp>
+      <p:sp>
+        <p:nvSpPr>
+          <p:cNvPr id="41" name="Rectangle 40">
+            <a:extLst>
+              <a:ext uri="{FF2B5EF4-FFF2-40B4-BE49-F238E27FC236}">
+                <a16:creationId xmlns:a16="http://schemas.microsoft.com/office/drawing/2014/main" id="{D6DA6CCD-4A70-834D-A05B-9745EE8C4038}"/>
+              </a:ext>
+            </a:extLst>
+          </p:cNvPr>
+          <p:cNvSpPr/>
+          <p:nvPr/>
+        </p:nvSpPr>
+        <p:spPr>
+          <a:xfrm>
+            <a:off x="1781955" y="6029785"/>
+            <a:ext cx="9823622" cy="642307"/>
+          </a:xfrm>
+          <a:prstGeom prst="rect">
+            <a:avLst/>
+          </a:prstGeom>
+          <a:noFill/>
+          <a:ln>
+            <a:solidFill>
+              <a:schemeClr val="accent1"/>
+            </a:solidFill>
+          </a:ln>
+        </p:spPr>
+        <p:style>
+          <a:lnRef idx="2">
+            <a:schemeClr val="accent1">
+              <a:shade val="50000"/>
+            </a:schemeClr>
+          </a:lnRef>
+          <a:fillRef idx="1">
+            <a:schemeClr val="accent1"/>
+          </a:fillRef>
+          <a:effectRef idx="0">
+            <a:schemeClr val="accent1"/>
+          </a:effectRef>
+          <a:fontRef idx="minor">
+            <a:schemeClr val="lt1"/>
+          </a:fontRef>
+        </p:style>
+        <p:txBody>
+          <a:bodyPr rtlCol="0" anchor="ctr"/>
+          <a:lstStyle/>
+          <a:p>
+            <a:pPr algn="ctr"/>
+            <a:r>
+              <a:rPr lang="en-US" dirty="0">
+                <a:solidFill>
+                  <a:schemeClr val="tx1"/>
+                </a:solidFill>
+              </a:rPr>
+              <a:t>Disclaimer</a:t>
+            </a:r>
+          </a:p>
+        </p:txBody>
+      </p:sp>
+    </p:spTree>
+    <p:extLst>
+      <p:ext uri="{BB962C8B-B14F-4D97-AF65-F5344CB8AC3E}">
+        <p14:creationId xmlns:p14="http://schemas.microsoft.com/office/powerpoint/2010/main" val="1845322746"/>
+      </p:ext>
+    </p:extLst>
+  </p:cSld>
+  <p:clrMapOvr>
+    <a:masterClrMapping/>
+  </p:clrMapOvr>
+</p:sld>
+</file>
+
+<file path=ppt/slides/slide6.xml><?xml version="1.0" encoding="utf-8"?>
+<p:sld xmlns:a="http://schemas.openxmlformats.org/drawingml/2006/main" xmlns:r="http://schemas.openxmlformats.org/officeDocument/2006/relationships" xmlns:p="http://schemas.openxmlformats.org/presentationml/2006/main">
+  <p:cSld>
+    <p:spTree>
+      <p:nvGrpSpPr>
+        <p:cNvPr id="1" name=""/>
+        <p:cNvGrpSpPr/>
+        <p:nvPr/>
+      </p:nvGrpSpPr>
+      <p:grpSpPr>
+        <a:xfrm>
+          <a:off x="0" y="0"/>
+          <a:ext cx="0" cy="0"/>
+          <a:chOff x="0" y="0"/>
+          <a:chExt cx="0" cy="0"/>
+        </a:xfrm>
+      </p:grpSpPr>
+      <p:sp>
+        <p:nvSpPr>
           <p:cNvPr id="2" name="Title 1">
             <a:extLst>
               <a:ext uri="{FF2B5EF4-FFF2-40B4-BE49-F238E27FC236}">
@@ -10841,7 +12855,7 @@
 </p:sld>
 </file>
 
-<file path=ppt/slides/slide6.xml><?xml version="1.0" encoding="utf-8"?>
+<file path=ppt/slides/slide7.xml><?xml version="1.0" encoding="utf-8"?>
 <p:sld xmlns:a="http://schemas.openxmlformats.org/drawingml/2006/main" xmlns:r="http://schemas.openxmlformats.org/officeDocument/2006/relationships" xmlns:p="http://schemas.openxmlformats.org/presentationml/2006/main">
   <p:cSld>
     <p:spTree>

</xml_diff>

<commit_message>
Mock up layout updated
</commit_message>
<xml_diff>
--- a/stonks_app.pptx
+++ b/stonks_app.pptx
@@ -10984,7 +10984,7 @@
         </p:nvSpPr>
         <p:spPr>
           <a:xfrm>
-            <a:off x="154280" y="2879779"/>
+            <a:off x="154280" y="2684102"/>
             <a:ext cx="1239514" cy="308919"/>
           </a:xfrm>
           <a:prstGeom prst="rect">
@@ -11429,7 +11429,7 @@
         </p:nvSpPr>
         <p:spPr>
           <a:xfrm>
-            <a:off x="154280" y="1397933"/>
+            <a:off x="154280" y="1828117"/>
             <a:ext cx="1239514" cy="308919"/>
           </a:xfrm>
           <a:prstGeom prst="rect">
@@ -11954,64 +11954,6 @@
           </a:graphicData>
         </a:graphic>
       </p:graphicFrame>
-      <p:sp>
-        <p:nvSpPr>
-          <p:cNvPr id="33" name="Rectangle 32">
-            <a:extLst>
-              <a:ext uri="{FF2B5EF4-FFF2-40B4-BE49-F238E27FC236}">
-                <a16:creationId xmlns:a16="http://schemas.microsoft.com/office/drawing/2014/main" id="{EBD4ACE8-A2F7-1748-814E-F266072BC274}"/>
-              </a:ext>
-            </a:extLst>
-          </p:cNvPr>
-          <p:cNvSpPr/>
-          <p:nvPr/>
-        </p:nvSpPr>
-        <p:spPr>
-          <a:xfrm>
-            <a:off x="154280" y="2071308"/>
-            <a:ext cx="1239514" cy="308919"/>
-          </a:xfrm>
-          <a:prstGeom prst="rect">
-            <a:avLst/>
-          </a:prstGeom>
-          <a:noFill/>
-          <a:ln>
-            <a:solidFill>
-              <a:schemeClr val="accent1"/>
-            </a:solidFill>
-          </a:ln>
-        </p:spPr>
-        <p:style>
-          <a:lnRef idx="2">
-            <a:schemeClr val="accent1">
-              <a:shade val="50000"/>
-            </a:schemeClr>
-          </a:lnRef>
-          <a:fillRef idx="1">
-            <a:schemeClr val="accent1"/>
-          </a:fillRef>
-          <a:effectRef idx="0">
-            <a:schemeClr val="accent1"/>
-          </a:effectRef>
-          <a:fontRef idx="minor">
-            <a:schemeClr val="lt1"/>
-          </a:fontRef>
-        </p:style>
-        <p:txBody>
-          <a:bodyPr rtlCol="0" anchor="ctr"/>
-          <a:lstStyle/>
-          <a:p>
-            <a:r>
-              <a:rPr lang="en-US" dirty="0">
-                <a:solidFill>
-                  <a:schemeClr val="tx1"/>
-                </a:solidFill>
-              </a:rPr>
-              <a:t>Enter $</a:t>
-            </a:r>
-          </a:p>
-        </p:txBody>
-      </p:sp>
       <p:graphicFrame>
         <p:nvGraphicFramePr>
           <p:cNvPr id="34" name="Table 32">

</xml_diff>